<commit_message>
Update to Day 1 PP
</commit_message>
<xml_diff>
--- a/powerpoints/Day_1.pptx
+++ b/powerpoints/Day_1.pptx
@@ -626,7 +626,7 @@
           <a:p>
             <a:fld id="{9C41E336-FA77-4937-9F43-09B79C1702B9}" type="datetimeFigureOut">
               <a:rPr lang="en-US" smtClean="0"/>
-              <a:t>6/7/2021</a:t>
+              <a:t>7/12/2021</a:t>
             </a:fld>
             <a:endParaRPr lang="en-US"/>
           </a:p>
@@ -40352,7 +40352,7 @@
               <a:rPr lang="en-US" dirty="0">
                 <a:hlinkClick r:id="rId3"/>
               </a:rPr>
-              <a:t>https://github.com/jhigherevature/210517JMSA/blob/main/installation/README.md</a:t>
+              <a:t>https://github.com/jhigherevature/210712-JavaPrimer/blob/main/installation/README.md</a:t>
             </a:r>
             <a:endParaRPr lang="en-US" dirty="0"/>
           </a:p>

</xml_diff>